<commit_message>
updated powerpoint (credits to Branden)
</commit_message>
<xml_diff>
--- a/Presentation/conference-presentation.pptx
+++ b/Presentation/conference-presentation.pptx
@@ -1,6 +1,6 @@
 
 <file path=ppt/presentation.xml><?xml version="1.0" encoding="utf-8"?>
-<p:presentation xmlns:a="http://schemas.openxmlformats.org/drawingml/2006/main" xmlns:r="http://schemas.openxmlformats.org/officeDocument/2006/relationships" xmlns:p="http://schemas.openxmlformats.org/presentationml/2006/main" autoCompressPictures="0">
+<p:presentation xmlns:a="http://schemas.openxmlformats.org/drawingml/2006/main" xmlns:r="http://schemas.openxmlformats.org/officeDocument/2006/relationships" xmlns:p="http://schemas.openxmlformats.org/presentationml/2006/main" saveSubsetFonts="1" autoCompressPictures="0">
   <p:sldMasterIdLst>
     <p:sldMasterId id="2147483648" r:id="rId1"/>
   </p:sldMasterIdLst>
@@ -9,7 +9,11 @@
     <p:sldId id="260" r:id="rId3"/>
     <p:sldId id="257" r:id="rId4"/>
     <p:sldId id="258" r:id="rId5"/>
-    <p:sldId id="259" r:id="rId6"/>
+    <p:sldId id="264" r:id="rId6"/>
+    <p:sldId id="259" r:id="rId7"/>
+    <p:sldId id="261" r:id="rId8"/>
+    <p:sldId id="262" r:id="rId9"/>
+    <p:sldId id="263" r:id="rId10"/>
   </p:sldIdLst>
   <p:sldSz cx="12192000" cy="6858000"/>
   <p:notesSz cx="6858000" cy="9144000"/>
@@ -108,6 +112,11 @@
       </a:defRPr>
     </a:lvl9pPr>
   </p:defaultTextStyle>
+  <p:extLst>
+    <p:ext uri="{EFAFB233-063F-42B5-8137-9DF3F51BA10A}">
+      <p15:sldGuideLst xmlns:p15="http://schemas.microsoft.com/office/powerpoint/2012/main"/>
+    </p:ext>
+  </p:extLst>
 </p:presentation>
 </file>
 
@@ -443,7 +452,7 @@
             <a:fld id="{B61BEF0D-F0BB-DE4B-95CE-6DB70DBA9567}" type="datetimeFigureOut">
               <a:rPr lang="en-US" dirty="0"/>
               <a:pPr/>
-              <a:t>4/4/2017</a:t>
+              <a:t>4/6/17</a:t>
             </a:fld>
             <a:endParaRPr lang="en-US" dirty="0"/>
           </a:p>
@@ -764,7 +773,7 @@
             <a:fld id="{B61BEF0D-F0BB-DE4B-95CE-6DB70DBA9567}" type="datetimeFigureOut">
               <a:rPr lang="en-US" dirty="0"/>
               <a:pPr/>
-              <a:t>4/4/2017</a:t>
+              <a:t>4/6/17</a:t>
             </a:fld>
             <a:endParaRPr lang="en-US" dirty="0"/>
           </a:p>
@@ -1009,7 +1018,7 @@
             <a:fld id="{B61BEF0D-F0BB-DE4B-95CE-6DB70DBA9567}" type="datetimeFigureOut">
               <a:rPr lang="en-US" dirty="0"/>
               <a:pPr/>
-              <a:t>4/4/2017</a:t>
+              <a:t>4/6/17</a:t>
             </a:fld>
             <a:endParaRPr lang="en-US" dirty="0"/>
           </a:p>
@@ -1345,7 +1354,7 @@
             <a:fld id="{B61BEF0D-F0BB-DE4B-95CE-6DB70DBA9567}" type="datetimeFigureOut">
               <a:rPr lang="en-US" dirty="0"/>
               <a:pPr/>
-              <a:t>4/4/2017</a:t>
+              <a:t>4/6/17</a:t>
             </a:fld>
             <a:endParaRPr lang="en-US" dirty="0"/>
           </a:p>
@@ -1689,7 +1698,7 @@
             <a:fld id="{B61BEF0D-F0BB-DE4B-95CE-6DB70DBA9567}" type="datetimeFigureOut">
               <a:rPr lang="en-US" dirty="0"/>
               <a:pPr/>
-              <a:t>4/4/2017</a:t>
+              <a:t>4/6/17</a:t>
             </a:fld>
             <a:endParaRPr lang="en-US" dirty="0"/>
           </a:p>
@@ -2060,7 +2069,7 @@
             <a:fld id="{B61BEF0D-F0BB-DE4B-95CE-6DB70DBA9567}" type="datetimeFigureOut">
               <a:rPr lang="en-US" dirty="0"/>
               <a:pPr/>
-              <a:t>4/4/2017</a:t>
+              <a:t>4/6/17</a:t>
             </a:fld>
             <a:endParaRPr lang="en-US" dirty="0"/>
           </a:p>
@@ -2527,7 +2536,7 @@
             <a:fld id="{B61BEF0D-F0BB-DE4B-95CE-6DB70DBA9567}" type="datetimeFigureOut">
               <a:rPr lang="en-US" dirty="0"/>
               <a:pPr/>
-              <a:t>4/4/2017</a:t>
+              <a:t>4/6/17</a:t>
             </a:fld>
             <a:endParaRPr lang="en-US" dirty="0"/>
           </a:p>
@@ -2729,7 +2738,7 @@
             <a:fld id="{B61BEF0D-F0BB-DE4B-95CE-6DB70DBA9567}" type="datetimeFigureOut">
               <a:rPr lang="en-US" dirty="0"/>
               <a:pPr/>
-              <a:t>4/4/2017</a:t>
+              <a:t>4/6/17</a:t>
             </a:fld>
             <a:endParaRPr lang="en-US" dirty="0"/>
           </a:p>
@@ -2937,7 +2946,7 @@
             <a:fld id="{B61BEF0D-F0BB-DE4B-95CE-6DB70DBA9567}" type="datetimeFigureOut">
               <a:rPr lang="en-US" dirty="0"/>
               <a:pPr/>
-              <a:t>4/4/2017</a:t>
+              <a:t>4/6/17</a:t>
             </a:fld>
             <a:endParaRPr lang="en-US" dirty="0"/>
           </a:p>
@@ -3165,7 +3174,7 @@
           <a:p>
             <a:fld id="{52647F38-B617-4D2F-AE0A-013F0C4D2C57}" type="datetimeFigureOut">
               <a:rPr lang="en-US" dirty="0"/>
-              <a:t>4/4/2017</a:t>
+              <a:t>4/6/17</a:t>
             </a:fld>
             <a:endParaRPr lang="en-US" dirty="0"/>
           </a:p>
@@ -3409,7 +3418,7 @@
             <a:fld id="{B61BEF0D-F0BB-DE4B-95CE-6DB70DBA9567}" type="datetimeFigureOut">
               <a:rPr lang="en-US" dirty="0"/>
               <a:pPr/>
-              <a:t>4/4/2017</a:t>
+              <a:t>4/6/17</a:t>
             </a:fld>
             <a:endParaRPr lang="en-US" dirty="0"/>
           </a:p>
@@ -3703,7 +3712,7 @@
           <a:p>
             <a:fld id="{05BFA754-D5C3-4E66-96A6-867B257F58DC}" type="datetimeFigureOut">
               <a:rPr lang="en-US" dirty="0"/>
-              <a:t>4/4/2017</a:t>
+              <a:t>4/6/17</a:t>
             </a:fld>
             <a:endParaRPr lang="en-US" dirty="0"/>
           </a:p>
@@ -4093,7 +4102,7 @@
             <a:fld id="{B61BEF0D-F0BB-DE4B-95CE-6DB70DBA9567}" type="datetimeFigureOut">
               <a:rPr lang="en-US" dirty="0"/>
               <a:pPr/>
-              <a:t>4/4/2017</a:t>
+              <a:t>4/6/17</a:t>
             </a:fld>
             <a:endParaRPr lang="en-US" dirty="0"/>
           </a:p>
@@ -4239,7 +4248,7 @@
             <a:fld id="{B61BEF0D-F0BB-DE4B-95CE-6DB70DBA9567}" type="datetimeFigureOut">
               <a:rPr lang="en-US" dirty="0"/>
               <a:pPr/>
-              <a:t>4/4/2017</a:t>
+              <a:t>4/6/17</a:t>
             </a:fld>
             <a:endParaRPr lang="en-US" dirty="0"/>
           </a:p>
@@ -4362,7 +4371,7 @@
             <a:fld id="{B61BEF0D-F0BB-DE4B-95CE-6DB70DBA9567}" type="datetimeFigureOut">
               <a:rPr lang="en-US" dirty="0"/>
               <a:pPr/>
-              <a:t>4/4/2017</a:t>
+              <a:t>4/6/17</a:t>
             </a:fld>
             <a:endParaRPr lang="en-US" dirty="0"/>
           </a:p>
@@ -4614,7 +4623,7 @@
             <a:fld id="{B61BEF0D-F0BB-DE4B-95CE-6DB70DBA9567}" type="datetimeFigureOut">
               <a:rPr lang="en-US" dirty="0"/>
               <a:pPr/>
-              <a:t>4/4/2017</a:t>
+              <a:t>4/6/17</a:t>
             </a:fld>
             <a:endParaRPr lang="en-US" dirty="0"/>
           </a:p>
@@ -4926,7 +4935,7 @@
             <a:fld id="{B61BEF0D-F0BB-DE4B-95CE-6DB70DBA9567}" type="datetimeFigureOut">
               <a:rPr lang="en-US" dirty="0"/>
               <a:pPr/>
-              <a:t>4/4/2017</a:t>
+              <a:t>4/6/17</a:t>
             </a:fld>
             <a:endParaRPr lang="en-US" dirty="0"/>
           </a:p>
@@ -5274,7 +5283,7 @@
             <a:fld id="{B61BEF0D-F0BB-DE4B-95CE-6DB70DBA9567}" type="datetimeFigureOut">
               <a:rPr lang="en-US" dirty="0"/>
               <a:pPr/>
-              <a:t>4/4/2017</a:t>
+              <a:t>4/6/17</a:t>
             </a:fld>
             <a:endParaRPr lang="en-US" dirty="0"/>
           </a:p>
@@ -5941,12 +5950,6 @@
           <a:bodyPr/>
           <a:lstStyle/>
           <a:p>
-            <a:r>
-              <a:rPr lang="en-US" dirty="0" smtClean="0"/>
-              <a:t>“Extra(X) Fancy(F) Mobile(M) Vending Machine”</a:t>
-            </a:r>
-          </a:p>
-          <a:p>
             <a:endParaRPr lang="en-US" dirty="0" smtClean="0"/>
           </a:p>
           <a:p>
@@ -6168,20 +6171,13 @@
             <a:pPr lvl="1"/>
             <a:r>
               <a:rPr lang="en-US" dirty="0"/>
-              <a:t>Team meetings held twice a week to discuss and work on the robotic system</a:t>
-            </a:r>
-          </a:p>
-          <a:p>
-            <a:pPr marL="0" indent="0">
-              <a:buNone/>
-            </a:pPr>
+              <a:t>Team meetings held twice a week to discuss and work on the robotic </a:t>
+            </a:r>
+            <a:r>
+              <a:rPr lang="en-US" dirty="0" smtClean="0"/>
+              <a:t>system</a:t>
+            </a:r>
             <a:endParaRPr lang="en-US" dirty="0" smtClean="0"/>
-          </a:p>
-          <a:p>
-            <a:r>
-              <a:rPr lang="en-US" dirty="0" smtClean="0"/>
-              <a:t>W</a:t>
-            </a:r>
           </a:p>
           <a:p>
             <a:pPr lvl="1"/>
@@ -6235,8 +6231,120 @@
           <a:lstStyle/>
           <a:p>
             <a:r>
+              <a:rPr lang="en-US" smtClean="0"/>
+              <a:t>Components (consider replacing with pics)</a:t>
+            </a:r>
+            <a:endParaRPr lang="en-US" dirty="0"/>
+          </a:p>
+        </p:txBody>
+      </p:sp>
+      <p:sp>
+        <p:nvSpPr>
+          <p:cNvPr id="3" name="Content Placeholder 2"/>
+          <p:cNvSpPr>
+            <a:spLocks noGrp="1"/>
+          </p:cNvSpPr>
+          <p:nvPr>
+            <p:ph idx="1"/>
+          </p:nvPr>
+        </p:nvSpPr>
+        <p:spPr/>
+        <p:txBody>
+          <a:bodyPr>
+            <a:normAutofit/>
+          </a:bodyPr>
+          <a:lstStyle/>
+          <a:p>
+            <a:r>
               <a:rPr lang="en-US" dirty="0" smtClean="0"/>
-              <a:t>Introduction</a:t>
+              <a:t>Arm</a:t>
+            </a:r>
+          </a:p>
+          <a:p>
+            <a:r>
+              <a:rPr lang="en-US" dirty="0" smtClean="0"/>
+              <a:t>Rover chassis</a:t>
+            </a:r>
+          </a:p>
+          <a:p>
+            <a:r>
+              <a:rPr lang="en-US" dirty="0" smtClean="0"/>
+              <a:t>Arduino microcontroller</a:t>
+            </a:r>
+          </a:p>
+          <a:p>
+            <a:r>
+              <a:rPr lang="en-US" dirty="0" smtClean="0"/>
+              <a:t>RGB color sensor</a:t>
+            </a:r>
+          </a:p>
+          <a:p>
+            <a:r>
+              <a:rPr lang="en-US" dirty="0" smtClean="0"/>
+              <a:t>Line follower sensor</a:t>
+            </a:r>
+          </a:p>
+          <a:p>
+            <a:r>
+              <a:rPr lang="en-US" dirty="0" smtClean="0"/>
+              <a:t>A bag of mints</a:t>
+            </a:r>
+            <a:endParaRPr lang="en-US" dirty="0" smtClean="0"/>
+          </a:p>
+          <a:p>
+            <a:pPr lvl="1"/>
+            <a:endParaRPr lang="en-US" dirty="0" smtClean="0"/>
+          </a:p>
+        </p:txBody>
+      </p:sp>
+    </p:spTree>
+    <p:extLst>
+      <p:ext uri="{BB962C8B-B14F-4D97-AF65-F5344CB8AC3E}">
+        <p14:creationId xmlns:p14="http://schemas.microsoft.com/office/powerpoint/2010/main" val="1804044402"/>
+      </p:ext>
+    </p:extLst>
+  </p:cSld>
+  <p:clrMapOvr>
+    <a:masterClrMapping/>
+  </p:clrMapOvr>
+</p:sld>
+</file>
+
+<file path=ppt/slides/slide6.xml><?xml version="1.0" encoding="utf-8"?>
+<p:sld xmlns:a="http://schemas.openxmlformats.org/drawingml/2006/main" xmlns:r="http://schemas.openxmlformats.org/officeDocument/2006/relationships" xmlns:p="http://schemas.openxmlformats.org/presentationml/2006/main">
+  <p:cSld>
+    <p:spTree>
+      <p:nvGrpSpPr>
+        <p:cNvPr id="1" name=""/>
+        <p:cNvGrpSpPr/>
+        <p:nvPr/>
+      </p:nvGrpSpPr>
+      <p:grpSpPr>
+        <a:xfrm>
+          <a:off x="0" y="0"/>
+          <a:ext cx="0" cy="0"/>
+          <a:chOff x="0" y="0"/>
+          <a:chExt cx="0" cy="0"/>
+        </a:xfrm>
+      </p:grpSpPr>
+      <p:sp>
+        <p:nvSpPr>
+          <p:cNvPr id="2" name="Title 1"/>
+          <p:cNvSpPr>
+            <a:spLocks noGrp="1"/>
+          </p:cNvSpPr>
+          <p:nvPr>
+            <p:ph type="title"/>
+          </p:nvPr>
+        </p:nvSpPr>
+        <p:spPr/>
+        <p:txBody>
+          <a:bodyPr/>
+          <a:lstStyle/>
+          <a:p>
+            <a:r>
+              <a:rPr lang="en-US" dirty="0" smtClean="0"/>
+              <a:t>Order of Completion</a:t>
             </a:r>
             <a:endParaRPr lang="en-US" dirty="0"/>
           </a:p>
@@ -6254,10 +6362,49 @@
         </p:nvSpPr>
         <p:spPr/>
         <p:txBody>
-          <a:bodyPr/>
-          <a:lstStyle/>
-          <a:p>
-            <a:endParaRPr lang="en-US" dirty="0"/>
+          <a:bodyPr>
+            <a:normAutofit/>
+          </a:bodyPr>
+          <a:lstStyle/>
+          <a:p>
+            <a:r>
+              <a:rPr lang="en-US" sz="2000" dirty="0" smtClean="0"/>
+              <a:t>Tested navigation of the robot via the four wheels</a:t>
+            </a:r>
+            <a:endParaRPr lang="en-US" sz="2000" dirty="0" smtClean="0"/>
+          </a:p>
+          <a:p>
+            <a:r>
+              <a:rPr lang="en-US" sz="2000" dirty="0" smtClean="0"/>
+              <a:t>Assembled and tested the robotic arm</a:t>
+            </a:r>
+          </a:p>
+          <a:p>
+            <a:r>
+              <a:rPr lang="en-US" sz="2000" dirty="0" smtClean="0"/>
+              <a:t>Prepared and mounted a sturdier platform on top of the chassis</a:t>
+            </a:r>
+          </a:p>
+          <a:p>
+            <a:r>
+              <a:rPr lang="en-US" sz="2000" dirty="0" smtClean="0"/>
+              <a:t>Mounted and tuned the RGB color sensor</a:t>
+            </a:r>
+          </a:p>
+          <a:p>
+            <a:r>
+              <a:rPr lang="en-US" sz="2000" dirty="0" smtClean="0"/>
+              <a:t>Mounted and tuned the line follower sensor</a:t>
+            </a:r>
+          </a:p>
+          <a:p>
+            <a:r>
+              <a:rPr lang="en-US" sz="2000" dirty="0" smtClean="0"/>
+              <a:t>Integrated all the different parts together to form the robotic system in its entirety</a:t>
+            </a:r>
+          </a:p>
+          <a:p>
+            <a:endParaRPr lang="en-US" sz="2000" dirty="0"/>
           </a:p>
         </p:txBody>
       </p:sp>
@@ -6265,6 +6412,352 @@
     <p:extLst>
       <p:ext uri="{BB962C8B-B14F-4D97-AF65-F5344CB8AC3E}">
         <p14:creationId xmlns:p14="http://schemas.microsoft.com/office/powerpoint/2010/main" val="391493129"/>
+      </p:ext>
+    </p:extLst>
+  </p:cSld>
+  <p:clrMapOvr>
+    <a:masterClrMapping/>
+  </p:clrMapOvr>
+</p:sld>
+</file>
+
+<file path=ppt/slides/slide7.xml><?xml version="1.0" encoding="utf-8"?>
+<p:sld xmlns:a="http://schemas.openxmlformats.org/drawingml/2006/main" xmlns:r="http://schemas.openxmlformats.org/officeDocument/2006/relationships" xmlns:p="http://schemas.openxmlformats.org/presentationml/2006/main">
+  <p:cSld>
+    <p:spTree>
+      <p:nvGrpSpPr>
+        <p:cNvPr id="1" name=""/>
+        <p:cNvGrpSpPr/>
+        <p:nvPr/>
+      </p:nvGrpSpPr>
+      <p:grpSpPr>
+        <a:xfrm>
+          <a:off x="0" y="0"/>
+          <a:ext cx="0" cy="0"/>
+          <a:chOff x="0" y="0"/>
+          <a:chExt cx="0" cy="0"/>
+        </a:xfrm>
+      </p:grpSpPr>
+      <p:sp>
+        <p:nvSpPr>
+          <p:cNvPr id="2" name="Title 1"/>
+          <p:cNvSpPr>
+            <a:spLocks noGrp="1"/>
+          </p:cNvSpPr>
+          <p:nvPr>
+            <p:ph type="title"/>
+          </p:nvPr>
+        </p:nvSpPr>
+        <p:spPr/>
+        <p:txBody>
+          <a:bodyPr/>
+          <a:lstStyle/>
+          <a:p>
+            <a:r>
+              <a:rPr lang="en-US" dirty="0" smtClean="0"/>
+              <a:t>How It Works</a:t>
+            </a:r>
+            <a:endParaRPr lang="en-US" dirty="0"/>
+          </a:p>
+        </p:txBody>
+      </p:sp>
+      <p:sp>
+        <p:nvSpPr>
+          <p:cNvPr id="3" name="Content Placeholder 2"/>
+          <p:cNvSpPr>
+            <a:spLocks noGrp="1"/>
+          </p:cNvSpPr>
+          <p:nvPr>
+            <p:ph idx="1"/>
+          </p:nvPr>
+        </p:nvSpPr>
+        <p:spPr/>
+        <p:txBody>
+          <a:bodyPr>
+            <a:normAutofit/>
+          </a:bodyPr>
+          <a:lstStyle/>
+          <a:p>
+            <a:endParaRPr lang="en-US" sz="1600" dirty="0" smtClean="0"/>
+          </a:p>
+          <a:p>
+            <a:r>
+              <a:rPr lang="en-US" sz="2000" dirty="0" smtClean="0"/>
+              <a:t>Line follower finds the path</a:t>
+            </a:r>
+            <a:endParaRPr lang="en-US" sz="2000" dirty="0" smtClean="0"/>
+          </a:p>
+          <a:p>
+            <a:r>
+              <a:rPr lang="en-US" sz="2000" dirty="0" smtClean="0"/>
+              <a:t>Rover moves forwards, then backwards</a:t>
+            </a:r>
+          </a:p>
+          <a:p>
+            <a:r>
+              <a:rPr lang="en-US" sz="2000" dirty="0" smtClean="0"/>
+              <a:t>RBG sensor detects order and arm activates</a:t>
+            </a:r>
+          </a:p>
+          <a:p>
+            <a:r>
+              <a:rPr lang="en-US" sz="2000" dirty="0" smtClean="0"/>
+              <a:t>Arm moves to grab mints on a predetermined path</a:t>
+            </a:r>
+          </a:p>
+          <a:p>
+            <a:r>
+              <a:rPr lang="en-US" sz="2000" dirty="0" smtClean="0"/>
+              <a:t>Robot Continues on path and reverses at the end of the table</a:t>
+            </a:r>
+          </a:p>
+          <a:p>
+            <a:endParaRPr lang="en-US" sz="2000" dirty="0"/>
+          </a:p>
+        </p:txBody>
+      </p:sp>
+    </p:spTree>
+    <p:extLst>
+      <p:ext uri="{BB962C8B-B14F-4D97-AF65-F5344CB8AC3E}">
+        <p14:creationId xmlns:p14="http://schemas.microsoft.com/office/powerpoint/2010/main" val="1511831870"/>
+      </p:ext>
+    </p:extLst>
+  </p:cSld>
+  <p:clrMapOvr>
+    <a:masterClrMapping/>
+  </p:clrMapOvr>
+</p:sld>
+</file>
+
+<file path=ppt/slides/slide8.xml><?xml version="1.0" encoding="utf-8"?>
+<p:sld xmlns:a="http://schemas.openxmlformats.org/drawingml/2006/main" xmlns:r="http://schemas.openxmlformats.org/officeDocument/2006/relationships" xmlns:p="http://schemas.openxmlformats.org/presentationml/2006/main">
+  <p:cSld>
+    <p:spTree>
+      <p:nvGrpSpPr>
+        <p:cNvPr id="1" name=""/>
+        <p:cNvGrpSpPr/>
+        <p:nvPr/>
+      </p:nvGrpSpPr>
+      <p:grpSpPr>
+        <a:xfrm>
+          <a:off x="0" y="0"/>
+          <a:ext cx="0" cy="0"/>
+          <a:chOff x="0" y="0"/>
+          <a:chExt cx="0" cy="0"/>
+        </a:xfrm>
+      </p:grpSpPr>
+      <p:sp>
+        <p:nvSpPr>
+          <p:cNvPr id="2" name="Title 1"/>
+          <p:cNvSpPr>
+            <a:spLocks noGrp="1"/>
+          </p:cNvSpPr>
+          <p:nvPr>
+            <p:ph type="title"/>
+          </p:nvPr>
+        </p:nvSpPr>
+        <p:spPr/>
+        <p:txBody>
+          <a:bodyPr/>
+          <a:lstStyle/>
+          <a:p>
+            <a:r>
+              <a:rPr lang="en-US" dirty="0" smtClean="0"/>
+              <a:t>Demo</a:t>
+            </a:r>
+            <a:endParaRPr lang="en-US" dirty="0"/>
+          </a:p>
+        </p:txBody>
+      </p:sp>
+      <p:sp>
+        <p:nvSpPr>
+          <p:cNvPr id="3" name="Content Placeholder 2"/>
+          <p:cNvSpPr>
+            <a:spLocks noGrp="1"/>
+          </p:cNvSpPr>
+          <p:nvPr>
+            <p:ph idx="1"/>
+          </p:nvPr>
+        </p:nvSpPr>
+        <p:spPr/>
+        <p:txBody>
+          <a:bodyPr>
+            <a:normAutofit/>
+          </a:bodyPr>
+          <a:lstStyle/>
+          <a:p>
+            <a:r>
+              <a:rPr lang="en-US" sz="2000" dirty="0" smtClean="0"/>
+              <a:t>Tested navigation of the robot via the four wheels</a:t>
+            </a:r>
+            <a:endParaRPr lang="en-US" sz="2000" dirty="0" smtClean="0"/>
+          </a:p>
+          <a:p>
+            <a:r>
+              <a:rPr lang="en-US" sz="2000" dirty="0" smtClean="0"/>
+              <a:t>Assembled and tested the robotic arm</a:t>
+            </a:r>
+          </a:p>
+          <a:p>
+            <a:r>
+              <a:rPr lang="en-US" sz="2000" dirty="0" smtClean="0"/>
+              <a:t>Prepared and mounted a sturdier platform on top of the chassis</a:t>
+            </a:r>
+          </a:p>
+          <a:p>
+            <a:r>
+              <a:rPr lang="en-US" sz="2000" dirty="0" smtClean="0"/>
+              <a:t>Mounted and tuned the RGB color sensor</a:t>
+            </a:r>
+          </a:p>
+          <a:p>
+            <a:r>
+              <a:rPr lang="en-US" sz="2000" dirty="0" smtClean="0"/>
+              <a:t>Mounted and tuned the line follower sensor</a:t>
+            </a:r>
+          </a:p>
+          <a:p>
+            <a:r>
+              <a:rPr lang="en-US" sz="2000" dirty="0" smtClean="0"/>
+              <a:t>Integrated all the different parts together to form the robotic system in its entirety</a:t>
+            </a:r>
+          </a:p>
+          <a:p>
+            <a:r>
+              <a:rPr lang="en-US" sz="2000" dirty="0" smtClean="0"/>
+              <a:t>Video link</a:t>
+            </a:r>
+          </a:p>
+          <a:p>
+            <a:endParaRPr lang="en-US" sz="2000" dirty="0"/>
+          </a:p>
+        </p:txBody>
+      </p:sp>
+    </p:spTree>
+    <p:extLst>
+      <p:ext uri="{BB962C8B-B14F-4D97-AF65-F5344CB8AC3E}">
+        <p14:creationId xmlns:p14="http://schemas.microsoft.com/office/powerpoint/2010/main" val="331727786"/>
+      </p:ext>
+    </p:extLst>
+  </p:cSld>
+  <p:clrMapOvr>
+    <a:masterClrMapping/>
+  </p:clrMapOvr>
+</p:sld>
+</file>
+
+<file path=ppt/slides/slide9.xml><?xml version="1.0" encoding="utf-8"?>
+<p:sld xmlns:a="http://schemas.openxmlformats.org/drawingml/2006/main" xmlns:r="http://schemas.openxmlformats.org/officeDocument/2006/relationships" xmlns:p="http://schemas.openxmlformats.org/presentationml/2006/main">
+  <p:cSld>
+    <p:spTree>
+      <p:nvGrpSpPr>
+        <p:cNvPr id="1" name=""/>
+        <p:cNvGrpSpPr/>
+        <p:nvPr/>
+      </p:nvGrpSpPr>
+      <p:grpSpPr>
+        <a:xfrm>
+          <a:off x="0" y="0"/>
+          <a:ext cx="0" cy="0"/>
+          <a:chOff x="0" y="0"/>
+          <a:chExt cx="0" cy="0"/>
+        </a:xfrm>
+      </p:grpSpPr>
+      <p:sp>
+        <p:nvSpPr>
+          <p:cNvPr id="2" name="Title 1"/>
+          <p:cNvSpPr>
+            <a:spLocks noGrp="1"/>
+          </p:cNvSpPr>
+          <p:nvPr>
+            <p:ph type="title"/>
+          </p:nvPr>
+        </p:nvSpPr>
+        <p:spPr/>
+        <p:txBody>
+          <a:bodyPr/>
+          <a:lstStyle/>
+          <a:p>
+            <a:r>
+              <a:rPr lang="en-US" dirty="0" smtClean="0"/>
+              <a:t>What We Learned</a:t>
+            </a:r>
+            <a:endParaRPr lang="en-US" dirty="0"/>
+          </a:p>
+        </p:txBody>
+      </p:sp>
+      <p:sp>
+        <p:nvSpPr>
+          <p:cNvPr id="3" name="Content Placeholder 2"/>
+          <p:cNvSpPr>
+            <a:spLocks noGrp="1"/>
+          </p:cNvSpPr>
+          <p:nvPr>
+            <p:ph idx="1"/>
+          </p:nvPr>
+        </p:nvSpPr>
+        <p:spPr/>
+        <p:txBody>
+          <a:bodyPr>
+            <a:normAutofit/>
+          </a:bodyPr>
+          <a:lstStyle/>
+          <a:p>
+            <a:r>
+              <a:rPr lang="en-US" sz="2000" dirty="0" smtClean="0"/>
+              <a:t>One challenge of amateur robot design is finding reliable sources of integrated circuits and batteries</a:t>
+            </a:r>
+          </a:p>
+          <a:p>
+            <a:r>
+              <a:rPr lang="en-US" sz="2000" dirty="0" smtClean="0"/>
+              <a:t>Using standard libraries </a:t>
+            </a:r>
+            <a:r>
+              <a:rPr lang="en-US" sz="2000" dirty="0" smtClean="0"/>
+              <a:t>A</a:t>
+            </a:r>
+            <a:r>
+              <a:rPr lang="en-US" sz="2000" dirty="0" smtClean="0"/>
+              <a:t>rduino means the code does not have to be complicated</a:t>
+            </a:r>
+          </a:p>
+          <a:p>
+            <a:pPr lvl="1"/>
+            <a:r>
+              <a:rPr lang="en-US" sz="1600" dirty="0" smtClean="0"/>
+              <a:t>However documentation of some functions is not thorough in English language</a:t>
+            </a:r>
+          </a:p>
+          <a:p>
+            <a:pPr lvl="1"/>
+            <a:r>
+              <a:rPr lang="en-US" sz="1600" dirty="0" smtClean="0"/>
+              <a:t>IDE could be improved</a:t>
+            </a:r>
+            <a:endParaRPr lang="en-US" sz="1600" dirty="0" smtClean="0"/>
+          </a:p>
+          <a:p>
+            <a:r>
+              <a:rPr lang="en-US" sz="2000" dirty="0" smtClean="0"/>
+              <a:t>RGB sensors need carefully controlled environments and algorithms</a:t>
+            </a:r>
+          </a:p>
+          <a:p>
+            <a:r>
+              <a:rPr lang="en-US" sz="2000" dirty="0" smtClean="0"/>
+              <a:t>General purpose robots are becoming more affordable, if not easily available</a:t>
+            </a:r>
+          </a:p>
+          <a:p>
+            <a:endParaRPr lang="en-US" sz="2000" dirty="0"/>
+          </a:p>
+        </p:txBody>
+      </p:sp>
+    </p:spTree>
+    <p:extLst>
+      <p:ext uri="{BB962C8B-B14F-4D97-AF65-F5344CB8AC3E}">
+        <p14:creationId xmlns:p14="http://schemas.microsoft.com/office/powerpoint/2010/main" val="481351690"/>
       </p:ext>
     </p:extLst>
   </p:cSld>

</xml_diff>